<commit_message>
Replace DFPWeiBei-B5 font with PingFang TC in mvccc_master_modern.pptx
- Replaced 72 occurrences of DFPWeiBei-B5 with PingFang TC
- PingFang TC is a default system font on macOS (since OS X 10.11)
- Modern, clean sans-serif font perfect for Chinese text
- Backed up old version as mvccc_master_modern_old.pptx

Font details:
- Replaced in: ppt/slideMasters/slideMaster1.xml
- PingFang TC works for both Traditional and Simplified Chinese
- Better readability and modern appearance for presentations
</commit_message>
<xml_diff>
--- a/mvccc_master_modern.pptx
+++ b/mvccc_master_modern.pptx
@@ -3678,10 +3678,10 @@
             </a:outerShdw>
           </a:effectLst>
           <a:uFillTx/>
-          <a:latin typeface="DFPWeiBei-B5-AZ"/>
-          <a:ea typeface="DFPWeiBei-B5-AZ"/>
-          <a:cs typeface="DFPWeiBei-B5-AZ"/>
-          <a:sym typeface="DFPWeiBei-B5-AZ"/>
+          <a:latin typeface="PingFang TC-AZ"/>
+          <a:ea typeface="PingFang TC-AZ"/>
+          <a:cs typeface="PingFang TC-AZ"/>
+          <a:sym typeface="PingFang TC-AZ"/>
         </a:defRPr>
       </a:lvl1pPr>
       <a:lvl2pPr marL="0" marR="0" indent="0" algn="ctr" defTabSz="914400" rtl="0" latinLnBrk="0">
@@ -3709,10 +3709,10 @@
             </a:outerShdw>
           </a:effectLst>
           <a:uFillTx/>
-          <a:latin typeface="DFPWeiBei-B5-AZ"/>
-          <a:ea typeface="DFPWeiBei-B5-AZ"/>
-          <a:cs typeface="DFPWeiBei-B5-AZ"/>
-          <a:sym typeface="DFPWeiBei-B5-AZ"/>
+          <a:latin typeface="PingFang TC-AZ"/>
+          <a:ea typeface="PingFang TC-AZ"/>
+          <a:cs typeface="PingFang TC-AZ"/>
+          <a:sym typeface="PingFang TC-AZ"/>
         </a:defRPr>
       </a:lvl2pPr>
       <a:lvl3pPr marL="0" marR="0" indent="0" algn="ctr" defTabSz="914400" rtl="0" latinLnBrk="0">
@@ -3740,10 +3740,10 @@
             </a:outerShdw>
           </a:effectLst>
           <a:uFillTx/>
-          <a:latin typeface="DFPWeiBei-B5-AZ"/>
-          <a:ea typeface="DFPWeiBei-B5-AZ"/>
-          <a:cs typeface="DFPWeiBei-B5-AZ"/>
-          <a:sym typeface="DFPWeiBei-B5-AZ"/>
+          <a:latin typeface="PingFang TC-AZ"/>
+          <a:ea typeface="PingFang TC-AZ"/>
+          <a:cs typeface="PingFang TC-AZ"/>
+          <a:sym typeface="PingFang TC-AZ"/>
         </a:defRPr>
       </a:lvl3pPr>
       <a:lvl4pPr marL="0" marR="0" indent="0" algn="ctr" defTabSz="914400" rtl="0" latinLnBrk="0">
@@ -3771,10 +3771,10 @@
             </a:outerShdw>
           </a:effectLst>
           <a:uFillTx/>
-          <a:latin typeface="DFPWeiBei-B5-AZ"/>
-          <a:ea typeface="DFPWeiBei-B5-AZ"/>
-          <a:cs typeface="DFPWeiBei-B5-AZ"/>
-          <a:sym typeface="DFPWeiBei-B5-AZ"/>
+          <a:latin typeface="PingFang TC-AZ"/>
+          <a:ea typeface="PingFang TC-AZ"/>
+          <a:cs typeface="PingFang TC-AZ"/>
+          <a:sym typeface="PingFang TC-AZ"/>
         </a:defRPr>
       </a:lvl4pPr>
       <a:lvl5pPr marL="0" marR="0" indent="0" algn="ctr" defTabSz="914400" rtl="0" latinLnBrk="0">
@@ -3802,10 +3802,10 @@
             </a:outerShdw>
           </a:effectLst>
           <a:uFillTx/>
-          <a:latin typeface="DFPWeiBei-B5-AZ"/>
-          <a:ea typeface="DFPWeiBei-B5-AZ"/>
-          <a:cs typeface="DFPWeiBei-B5-AZ"/>
-          <a:sym typeface="DFPWeiBei-B5-AZ"/>
+          <a:latin typeface="PingFang TC-AZ"/>
+          <a:ea typeface="PingFang TC-AZ"/>
+          <a:cs typeface="PingFang TC-AZ"/>
+          <a:sym typeface="PingFang TC-AZ"/>
         </a:defRPr>
       </a:lvl5pPr>
       <a:lvl6pPr marL="0" marR="0" indent="0" algn="ctr" defTabSz="914400" rtl="0" latinLnBrk="0">
@@ -3833,10 +3833,10 @@
             </a:outerShdw>
           </a:effectLst>
           <a:uFillTx/>
-          <a:latin typeface="DFPWeiBei-B5-AZ"/>
-          <a:ea typeface="DFPWeiBei-B5-AZ"/>
-          <a:cs typeface="DFPWeiBei-B5-AZ"/>
-          <a:sym typeface="DFPWeiBei-B5-AZ"/>
+          <a:latin typeface="PingFang TC-AZ"/>
+          <a:ea typeface="PingFang TC-AZ"/>
+          <a:cs typeface="PingFang TC-AZ"/>
+          <a:sym typeface="PingFang TC-AZ"/>
         </a:defRPr>
       </a:lvl6pPr>
       <a:lvl7pPr marL="0" marR="0" indent="0" algn="ctr" defTabSz="914400" rtl="0" latinLnBrk="0">
@@ -3864,10 +3864,10 @@
             </a:outerShdw>
           </a:effectLst>
           <a:uFillTx/>
-          <a:latin typeface="DFPWeiBei-B5-AZ"/>
-          <a:ea typeface="DFPWeiBei-B5-AZ"/>
-          <a:cs typeface="DFPWeiBei-B5-AZ"/>
-          <a:sym typeface="DFPWeiBei-B5-AZ"/>
+          <a:latin typeface="PingFang TC-AZ"/>
+          <a:ea typeface="PingFang TC-AZ"/>
+          <a:cs typeface="PingFang TC-AZ"/>
+          <a:sym typeface="PingFang TC-AZ"/>
         </a:defRPr>
       </a:lvl7pPr>
       <a:lvl8pPr marL="0" marR="0" indent="0" algn="ctr" defTabSz="914400" rtl="0" latinLnBrk="0">
@@ -3895,10 +3895,10 @@
             </a:outerShdw>
           </a:effectLst>
           <a:uFillTx/>
-          <a:latin typeface="DFPWeiBei-B5-AZ"/>
-          <a:ea typeface="DFPWeiBei-B5-AZ"/>
-          <a:cs typeface="DFPWeiBei-B5-AZ"/>
-          <a:sym typeface="DFPWeiBei-B5-AZ"/>
+          <a:latin typeface="PingFang TC-AZ"/>
+          <a:ea typeface="PingFang TC-AZ"/>
+          <a:cs typeface="PingFang TC-AZ"/>
+          <a:sym typeface="PingFang TC-AZ"/>
         </a:defRPr>
       </a:lvl8pPr>
       <a:lvl9pPr marL="0" marR="0" indent="0" algn="ctr" defTabSz="914400" rtl="0" latinLnBrk="0">
@@ -3926,10 +3926,10 @@
             </a:outerShdw>
           </a:effectLst>
           <a:uFillTx/>
-          <a:latin typeface="DFPWeiBei-B5-AZ"/>
-          <a:ea typeface="DFPWeiBei-B5-AZ"/>
-          <a:cs typeface="DFPWeiBei-B5-AZ"/>
-          <a:sym typeface="DFPWeiBei-B5-AZ"/>
+          <a:latin typeface="PingFang TC-AZ"/>
+          <a:ea typeface="PingFang TC-AZ"/>
+          <a:cs typeface="PingFang TC-AZ"/>
+          <a:sym typeface="PingFang TC-AZ"/>
         </a:defRPr>
       </a:lvl9pPr>
     </p:titleStyle>
@@ -3959,10 +3959,10 @@
             </a:outerShdw>
           </a:effectLst>
           <a:uFillTx/>
-          <a:latin typeface="DFPWeiBei-B5-AZ"/>
-          <a:ea typeface="DFPWeiBei-B5-AZ"/>
-          <a:cs typeface="DFPWeiBei-B5-AZ"/>
-          <a:sym typeface="DFPWeiBei-B5-AZ"/>
+          <a:latin typeface="PingFang TC-AZ"/>
+          <a:ea typeface="PingFang TC-AZ"/>
+          <a:cs typeface="PingFang TC-AZ"/>
+          <a:sym typeface="PingFang TC-AZ"/>
         </a:defRPr>
       </a:lvl1pPr>
       <a:lvl2pPr marL="1008289" marR="0" indent="-551088" algn="ctr" defTabSz="914400" rtl="0" latinLnBrk="0">
@@ -3990,10 +3990,10 @@
             </a:outerShdw>
           </a:effectLst>
           <a:uFillTx/>
-          <a:latin typeface="DFPWeiBei-B5-AZ"/>
-          <a:ea typeface="DFPWeiBei-B5-AZ"/>
-          <a:cs typeface="DFPWeiBei-B5-AZ"/>
-          <a:sym typeface="DFPWeiBei-B5-AZ"/>
+          <a:latin typeface="PingFang TC-AZ"/>
+          <a:ea typeface="PingFang TC-AZ"/>
+          <a:cs typeface="PingFang TC-AZ"/>
+          <a:sym typeface="PingFang TC-AZ"/>
         </a:defRPr>
       </a:lvl2pPr>
       <a:lvl3pPr marL="1428750" marR="0" indent="-514350" algn="ctr" defTabSz="914400" rtl="0" latinLnBrk="0">
@@ -4021,10 +4021,10 @@
             </a:outerShdw>
           </a:effectLst>
           <a:uFillTx/>
-          <a:latin typeface="DFPWeiBei-B5-AZ"/>
-          <a:ea typeface="DFPWeiBei-B5-AZ"/>
-          <a:cs typeface="DFPWeiBei-B5-AZ"/>
-          <a:sym typeface="DFPWeiBei-B5-AZ"/>
+          <a:latin typeface="PingFang TC-AZ"/>
+          <a:ea typeface="PingFang TC-AZ"/>
+          <a:cs typeface="PingFang TC-AZ"/>
+          <a:sym typeface="PingFang TC-AZ"/>
         </a:defRPr>
       </a:lvl3pPr>
       <a:lvl4pPr marL="1988820" marR="0" indent="-617219" algn="ctr" defTabSz="914400" rtl="0" latinLnBrk="0">
@@ -4052,10 +4052,10 @@
             </a:outerShdw>
           </a:effectLst>
           <a:uFillTx/>
-          <a:latin typeface="DFPWeiBei-B5-AZ"/>
-          <a:ea typeface="DFPWeiBei-B5-AZ"/>
-          <a:cs typeface="DFPWeiBei-B5-AZ"/>
-          <a:sym typeface="DFPWeiBei-B5-AZ"/>
+          <a:latin typeface="PingFang TC-AZ"/>
+          <a:ea typeface="PingFang TC-AZ"/>
+          <a:cs typeface="PingFang TC-AZ"/>
+          <a:sym typeface="PingFang TC-AZ"/>
         </a:defRPr>
       </a:lvl4pPr>
       <a:lvl5pPr marL="2446020" marR="0" indent="-617220" algn="ctr" defTabSz="914400" rtl="0" latinLnBrk="0">
@@ -4083,10 +4083,10 @@
             </a:outerShdw>
           </a:effectLst>
           <a:uFillTx/>
-          <a:latin typeface="DFPWeiBei-B5-AZ"/>
-          <a:ea typeface="DFPWeiBei-B5-AZ"/>
-          <a:cs typeface="DFPWeiBei-B5-AZ"/>
-          <a:sym typeface="DFPWeiBei-B5-AZ"/>
+          <a:latin typeface="PingFang TC-AZ"/>
+          <a:ea typeface="PingFang TC-AZ"/>
+          <a:cs typeface="PingFang TC-AZ"/>
+          <a:sym typeface="PingFang TC-AZ"/>
         </a:defRPr>
       </a:lvl5pPr>
       <a:lvl6pPr marL="2903218" marR="0" indent="-617218" algn="ctr" defTabSz="914400" rtl="0" latinLnBrk="0">
@@ -4114,10 +4114,10 @@
             </a:outerShdw>
           </a:effectLst>
           <a:uFillTx/>
-          <a:latin typeface="DFPWeiBei-B5-AZ"/>
-          <a:ea typeface="DFPWeiBei-B5-AZ"/>
-          <a:cs typeface="DFPWeiBei-B5-AZ"/>
-          <a:sym typeface="DFPWeiBei-B5-AZ"/>
+          <a:latin typeface="PingFang TC-AZ"/>
+          <a:ea typeface="PingFang TC-AZ"/>
+          <a:cs typeface="PingFang TC-AZ"/>
+          <a:sym typeface="PingFang TC-AZ"/>
         </a:defRPr>
       </a:lvl6pPr>
       <a:lvl7pPr marL="3360420" marR="0" indent="-617219" algn="ctr" defTabSz="914400" rtl="0" latinLnBrk="0">
@@ -4145,10 +4145,10 @@
             </a:outerShdw>
           </a:effectLst>
           <a:uFillTx/>
-          <a:latin typeface="DFPWeiBei-B5-AZ"/>
-          <a:ea typeface="DFPWeiBei-B5-AZ"/>
-          <a:cs typeface="DFPWeiBei-B5-AZ"/>
-          <a:sym typeface="DFPWeiBei-B5-AZ"/>
+          <a:latin typeface="PingFang TC-AZ"/>
+          <a:ea typeface="PingFang TC-AZ"/>
+          <a:cs typeface="PingFang TC-AZ"/>
+          <a:sym typeface="PingFang TC-AZ"/>
         </a:defRPr>
       </a:lvl7pPr>
       <a:lvl8pPr marL="3817620" marR="0" indent="-617219" algn="ctr" defTabSz="914400" rtl="0" latinLnBrk="0">
@@ -4176,10 +4176,10 @@
             </a:outerShdw>
           </a:effectLst>
           <a:uFillTx/>
-          <a:latin typeface="DFPWeiBei-B5-AZ"/>
-          <a:ea typeface="DFPWeiBei-B5-AZ"/>
-          <a:cs typeface="DFPWeiBei-B5-AZ"/>
-          <a:sym typeface="DFPWeiBei-B5-AZ"/>
+          <a:latin typeface="PingFang TC-AZ"/>
+          <a:ea typeface="PingFang TC-AZ"/>
+          <a:cs typeface="PingFang TC-AZ"/>
+          <a:sym typeface="PingFang TC-AZ"/>
         </a:defRPr>
       </a:lvl8pPr>
       <a:lvl9pPr marL="4274820" marR="0" indent="-617220" algn="ctr" defTabSz="914400" rtl="0" latinLnBrk="0">
@@ -4207,10 +4207,10 @@
             </a:outerShdw>
           </a:effectLst>
           <a:uFillTx/>
-          <a:latin typeface="DFPWeiBei-B5-AZ"/>
-          <a:ea typeface="DFPWeiBei-B5-AZ"/>
-          <a:cs typeface="DFPWeiBei-B5-AZ"/>
-          <a:sym typeface="DFPWeiBei-B5-AZ"/>
+          <a:latin typeface="PingFang TC-AZ"/>
+          <a:ea typeface="PingFang TC-AZ"/>
+          <a:cs typeface="PingFang TC-AZ"/>
+          <a:sym typeface="PingFang TC-AZ"/>
         </a:defRPr>
       </a:lvl9pPr>
     </p:bodyStyle>

</xml_diff>

<commit_message>
Fix font references: replace DFPWeiBei-B5 with PingFang TC (72 occurrences)
</commit_message>
<xml_diff>
--- a/mvccc_master_modern.pptx
+++ b/mvccc_master_modern.pptx
@@ -3678,10 +3678,10 @@
             </a:outerShdw>
           </a:effectLst>
           <a:uFillTx/>
-          <a:latin typeface="PingFang TC-AZ"/>
-          <a:ea typeface="PingFang TC-AZ"/>
-          <a:cs typeface="PingFang TC-AZ"/>
-          <a:sym typeface="PingFang TC-AZ"/>
+          <a:latin typeface="PingFang TC"/>
+          <a:ea typeface="PingFang TC"/>
+          <a:cs typeface="PingFang TC"/>
+          <a:sym typeface="PingFang TC"/>
         </a:defRPr>
       </a:lvl1pPr>
       <a:lvl2pPr marL="0" marR="0" indent="0" algn="ctr" defTabSz="914400" rtl="0" latinLnBrk="0">
@@ -3709,10 +3709,10 @@
             </a:outerShdw>
           </a:effectLst>
           <a:uFillTx/>
-          <a:latin typeface="PingFang TC-AZ"/>
-          <a:ea typeface="PingFang TC-AZ"/>
-          <a:cs typeface="PingFang TC-AZ"/>
-          <a:sym typeface="PingFang TC-AZ"/>
+          <a:latin typeface="PingFang TC"/>
+          <a:ea typeface="PingFang TC"/>
+          <a:cs typeface="PingFang TC"/>
+          <a:sym typeface="PingFang TC"/>
         </a:defRPr>
       </a:lvl2pPr>
       <a:lvl3pPr marL="0" marR="0" indent="0" algn="ctr" defTabSz="914400" rtl="0" latinLnBrk="0">
@@ -3740,10 +3740,10 @@
             </a:outerShdw>
           </a:effectLst>
           <a:uFillTx/>
-          <a:latin typeface="PingFang TC-AZ"/>
-          <a:ea typeface="PingFang TC-AZ"/>
-          <a:cs typeface="PingFang TC-AZ"/>
-          <a:sym typeface="PingFang TC-AZ"/>
+          <a:latin typeface="PingFang TC"/>
+          <a:ea typeface="PingFang TC"/>
+          <a:cs typeface="PingFang TC"/>
+          <a:sym typeface="PingFang TC"/>
         </a:defRPr>
       </a:lvl3pPr>
       <a:lvl4pPr marL="0" marR="0" indent="0" algn="ctr" defTabSz="914400" rtl="0" latinLnBrk="0">
@@ -3771,10 +3771,10 @@
             </a:outerShdw>
           </a:effectLst>
           <a:uFillTx/>
-          <a:latin typeface="PingFang TC-AZ"/>
-          <a:ea typeface="PingFang TC-AZ"/>
-          <a:cs typeface="PingFang TC-AZ"/>
-          <a:sym typeface="PingFang TC-AZ"/>
+          <a:latin typeface="PingFang TC"/>
+          <a:ea typeface="PingFang TC"/>
+          <a:cs typeface="PingFang TC"/>
+          <a:sym typeface="PingFang TC"/>
         </a:defRPr>
       </a:lvl4pPr>
       <a:lvl5pPr marL="0" marR="0" indent="0" algn="ctr" defTabSz="914400" rtl="0" latinLnBrk="0">
@@ -3802,10 +3802,10 @@
             </a:outerShdw>
           </a:effectLst>
           <a:uFillTx/>
-          <a:latin typeface="PingFang TC-AZ"/>
-          <a:ea typeface="PingFang TC-AZ"/>
-          <a:cs typeface="PingFang TC-AZ"/>
-          <a:sym typeface="PingFang TC-AZ"/>
+          <a:latin typeface="PingFang TC"/>
+          <a:ea typeface="PingFang TC"/>
+          <a:cs typeface="PingFang TC"/>
+          <a:sym typeface="PingFang TC"/>
         </a:defRPr>
       </a:lvl5pPr>
       <a:lvl6pPr marL="0" marR="0" indent="0" algn="ctr" defTabSz="914400" rtl="0" latinLnBrk="0">
@@ -3833,10 +3833,10 @@
             </a:outerShdw>
           </a:effectLst>
           <a:uFillTx/>
-          <a:latin typeface="PingFang TC-AZ"/>
-          <a:ea typeface="PingFang TC-AZ"/>
-          <a:cs typeface="PingFang TC-AZ"/>
-          <a:sym typeface="PingFang TC-AZ"/>
+          <a:latin typeface="PingFang TC"/>
+          <a:ea typeface="PingFang TC"/>
+          <a:cs typeface="PingFang TC"/>
+          <a:sym typeface="PingFang TC"/>
         </a:defRPr>
       </a:lvl6pPr>
       <a:lvl7pPr marL="0" marR="0" indent="0" algn="ctr" defTabSz="914400" rtl="0" latinLnBrk="0">
@@ -3864,10 +3864,10 @@
             </a:outerShdw>
           </a:effectLst>
           <a:uFillTx/>
-          <a:latin typeface="PingFang TC-AZ"/>
-          <a:ea typeface="PingFang TC-AZ"/>
-          <a:cs typeface="PingFang TC-AZ"/>
-          <a:sym typeface="PingFang TC-AZ"/>
+          <a:latin typeface="PingFang TC"/>
+          <a:ea typeface="PingFang TC"/>
+          <a:cs typeface="PingFang TC"/>
+          <a:sym typeface="PingFang TC"/>
         </a:defRPr>
       </a:lvl7pPr>
       <a:lvl8pPr marL="0" marR="0" indent="0" algn="ctr" defTabSz="914400" rtl="0" latinLnBrk="0">
@@ -3895,10 +3895,10 @@
             </a:outerShdw>
           </a:effectLst>
           <a:uFillTx/>
-          <a:latin typeface="PingFang TC-AZ"/>
-          <a:ea typeface="PingFang TC-AZ"/>
-          <a:cs typeface="PingFang TC-AZ"/>
-          <a:sym typeface="PingFang TC-AZ"/>
+          <a:latin typeface="PingFang TC"/>
+          <a:ea typeface="PingFang TC"/>
+          <a:cs typeface="PingFang TC"/>
+          <a:sym typeface="PingFang TC"/>
         </a:defRPr>
       </a:lvl8pPr>
       <a:lvl9pPr marL="0" marR="0" indent="0" algn="ctr" defTabSz="914400" rtl="0" latinLnBrk="0">
@@ -3926,10 +3926,10 @@
             </a:outerShdw>
           </a:effectLst>
           <a:uFillTx/>
-          <a:latin typeface="PingFang TC-AZ"/>
-          <a:ea typeface="PingFang TC-AZ"/>
-          <a:cs typeface="PingFang TC-AZ"/>
-          <a:sym typeface="PingFang TC-AZ"/>
+          <a:latin typeface="PingFang TC"/>
+          <a:ea typeface="PingFang TC"/>
+          <a:cs typeface="PingFang TC"/>
+          <a:sym typeface="PingFang TC"/>
         </a:defRPr>
       </a:lvl9pPr>
     </p:titleStyle>
@@ -3959,10 +3959,10 @@
             </a:outerShdw>
           </a:effectLst>
           <a:uFillTx/>
-          <a:latin typeface="PingFang TC-AZ"/>
-          <a:ea typeface="PingFang TC-AZ"/>
-          <a:cs typeface="PingFang TC-AZ"/>
-          <a:sym typeface="PingFang TC-AZ"/>
+          <a:latin typeface="PingFang TC"/>
+          <a:ea typeface="PingFang TC"/>
+          <a:cs typeface="PingFang TC"/>
+          <a:sym typeface="PingFang TC"/>
         </a:defRPr>
       </a:lvl1pPr>
       <a:lvl2pPr marL="1008289" marR="0" indent="-551088" algn="ctr" defTabSz="914400" rtl="0" latinLnBrk="0">
@@ -3990,10 +3990,10 @@
             </a:outerShdw>
           </a:effectLst>
           <a:uFillTx/>
-          <a:latin typeface="PingFang TC-AZ"/>
-          <a:ea typeface="PingFang TC-AZ"/>
-          <a:cs typeface="PingFang TC-AZ"/>
-          <a:sym typeface="PingFang TC-AZ"/>
+          <a:latin typeface="PingFang TC"/>
+          <a:ea typeface="PingFang TC"/>
+          <a:cs typeface="PingFang TC"/>
+          <a:sym typeface="PingFang TC"/>
         </a:defRPr>
       </a:lvl2pPr>
       <a:lvl3pPr marL="1428750" marR="0" indent="-514350" algn="ctr" defTabSz="914400" rtl="0" latinLnBrk="0">
@@ -4021,10 +4021,10 @@
             </a:outerShdw>
           </a:effectLst>
           <a:uFillTx/>
-          <a:latin typeface="PingFang TC-AZ"/>
-          <a:ea typeface="PingFang TC-AZ"/>
-          <a:cs typeface="PingFang TC-AZ"/>
-          <a:sym typeface="PingFang TC-AZ"/>
+          <a:latin typeface="PingFang TC"/>
+          <a:ea typeface="PingFang TC"/>
+          <a:cs typeface="PingFang TC"/>
+          <a:sym typeface="PingFang TC"/>
         </a:defRPr>
       </a:lvl3pPr>
       <a:lvl4pPr marL="1988820" marR="0" indent="-617219" algn="ctr" defTabSz="914400" rtl="0" latinLnBrk="0">
@@ -4052,10 +4052,10 @@
             </a:outerShdw>
           </a:effectLst>
           <a:uFillTx/>
-          <a:latin typeface="PingFang TC-AZ"/>
-          <a:ea typeface="PingFang TC-AZ"/>
-          <a:cs typeface="PingFang TC-AZ"/>
-          <a:sym typeface="PingFang TC-AZ"/>
+          <a:latin typeface="PingFang TC"/>
+          <a:ea typeface="PingFang TC"/>
+          <a:cs typeface="PingFang TC"/>
+          <a:sym typeface="PingFang TC"/>
         </a:defRPr>
       </a:lvl4pPr>
       <a:lvl5pPr marL="2446020" marR="0" indent="-617220" algn="ctr" defTabSz="914400" rtl="0" latinLnBrk="0">
@@ -4083,10 +4083,10 @@
             </a:outerShdw>
           </a:effectLst>
           <a:uFillTx/>
-          <a:latin typeface="PingFang TC-AZ"/>
-          <a:ea typeface="PingFang TC-AZ"/>
-          <a:cs typeface="PingFang TC-AZ"/>
-          <a:sym typeface="PingFang TC-AZ"/>
+          <a:latin typeface="PingFang TC"/>
+          <a:ea typeface="PingFang TC"/>
+          <a:cs typeface="PingFang TC"/>
+          <a:sym typeface="PingFang TC"/>
         </a:defRPr>
       </a:lvl5pPr>
       <a:lvl6pPr marL="2903218" marR="0" indent="-617218" algn="ctr" defTabSz="914400" rtl="0" latinLnBrk="0">
@@ -4114,10 +4114,10 @@
             </a:outerShdw>
           </a:effectLst>
           <a:uFillTx/>
-          <a:latin typeface="PingFang TC-AZ"/>
-          <a:ea typeface="PingFang TC-AZ"/>
-          <a:cs typeface="PingFang TC-AZ"/>
-          <a:sym typeface="PingFang TC-AZ"/>
+          <a:latin typeface="PingFang TC"/>
+          <a:ea typeface="PingFang TC"/>
+          <a:cs typeface="PingFang TC"/>
+          <a:sym typeface="PingFang TC"/>
         </a:defRPr>
       </a:lvl6pPr>
       <a:lvl7pPr marL="3360420" marR="0" indent="-617219" algn="ctr" defTabSz="914400" rtl="0" latinLnBrk="0">
@@ -4145,10 +4145,10 @@
             </a:outerShdw>
           </a:effectLst>
           <a:uFillTx/>
-          <a:latin typeface="PingFang TC-AZ"/>
-          <a:ea typeface="PingFang TC-AZ"/>
-          <a:cs typeface="PingFang TC-AZ"/>
-          <a:sym typeface="PingFang TC-AZ"/>
+          <a:latin typeface="PingFang TC"/>
+          <a:ea typeface="PingFang TC"/>
+          <a:cs typeface="PingFang TC"/>
+          <a:sym typeface="PingFang TC"/>
         </a:defRPr>
       </a:lvl7pPr>
       <a:lvl8pPr marL="3817620" marR="0" indent="-617219" algn="ctr" defTabSz="914400" rtl="0" latinLnBrk="0">
@@ -4176,10 +4176,10 @@
             </a:outerShdw>
           </a:effectLst>
           <a:uFillTx/>
-          <a:latin typeface="PingFang TC-AZ"/>
-          <a:ea typeface="PingFang TC-AZ"/>
-          <a:cs typeface="PingFang TC-AZ"/>
-          <a:sym typeface="PingFang TC-AZ"/>
+          <a:latin typeface="PingFang TC"/>
+          <a:ea typeface="PingFang TC"/>
+          <a:cs typeface="PingFang TC"/>
+          <a:sym typeface="PingFang TC"/>
         </a:defRPr>
       </a:lvl8pPr>
       <a:lvl9pPr marL="4274820" marR="0" indent="-617220" algn="ctr" defTabSz="914400" rtl="0" latinLnBrk="0">
@@ -4207,10 +4207,10 @@
             </a:outerShdw>
           </a:effectLst>
           <a:uFillTx/>
-          <a:latin typeface="PingFang TC-AZ"/>
-          <a:ea typeface="PingFang TC-AZ"/>
-          <a:cs typeface="PingFang TC-AZ"/>
-          <a:sym typeface="PingFang TC-AZ"/>
+          <a:latin typeface="PingFang TC"/>
+          <a:ea typeface="PingFang TC"/>
+          <a:cs typeface="PingFang TC"/>
+          <a:sym typeface="PingFang TC"/>
         </a:defRPr>
       </a:lvl9pPr>
     </p:bodyStyle>

</xml_diff>